<commit_message>
Edited Project Challenges slide
</commit_message>
<xml_diff>
--- a/Project 1 Presentation FINAL.pptx
+++ b/Project 1 Presentation FINAL.pptx
@@ -8165,15 +8165,7 @@
             </a:pPr>
             <a:r>
               <a:rPr lang="en-US" dirty="0"/>
-              <a:t>Dropped all rows with data that was not available (</a:t>
-            </a:r>
-            <a:r>
-              <a:rPr lang="en-US" dirty="0" err="1"/>
-              <a:t>NaN</a:t>
-            </a:r>
-            <a:r>
-              <a:rPr lang="en-US" dirty="0"/>
-              <a:t>)</a:t>
+              <a:t>Spend more time cleaning data</a:t>
             </a:r>
           </a:p>
           <a:p>

</xml_diff>